<commit_message>
adding a few more images for classes
</commit_message>
<xml_diff>
--- a/lecture_images/inheritance.pptx
+++ b/lecture_images/inheritance.pptx
@@ -6,6 +6,7 @@
   </p:sldMasterIdLst>
   <p:sldIdLst>
     <p:sldId id="256" r:id="rId2"/>
+    <p:sldId id="257" r:id="rId3"/>
   </p:sldIdLst>
   <p:sldSz cx="12192000" cy="6858000"/>
   <p:notesSz cx="6858000" cy="9144000"/>
@@ -104,6 +105,11 @@
       </a:defRPr>
     </a:lvl9pPr>
   </p:defaultTextStyle>
+  <p:extLst>
+    <p:ext uri="{EFAFB233-063F-42B5-8137-9DF3F51BA10A}">
+      <p15:sldGuideLst xmlns:p15="http://schemas.microsoft.com/office/powerpoint/2012/main"/>
+    </p:ext>
+  </p:extLst>
 </p:presentation>
 </file>
 
@@ -254,7 +260,7 @@
           <a:p>
             <a:fld id="{4E8FC487-CEE2-CA44-A5A6-98354CD61BBA}" type="datetimeFigureOut">
               <a:rPr lang="en-US" smtClean="0"/>
-              <a:t>1/16/24</a:t>
+              <a:t>2/15/24</a:t>
             </a:fld>
             <a:endParaRPr lang="en-US"/>
           </a:p>
@@ -452,7 +458,7 @@
           <a:p>
             <a:fld id="{4E8FC487-CEE2-CA44-A5A6-98354CD61BBA}" type="datetimeFigureOut">
               <a:rPr lang="en-US" smtClean="0"/>
-              <a:t>1/16/24</a:t>
+              <a:t>2/15/24</a:t>
             </a:fld>
             <a:endParaRPr lang="en-US"/>
           </a:p>
@@ -660,7 +666,7 @@
           <a:p>
             <a:fld id="{4E8FC487-CEE2-CA44-A5A6-98354CD61BBA}" type="datetimeFigureOut">
               <a:rPr lang="en-US" smtClean="0"/>
-              <a:t>1/16/24</a:t>
+              <a:t>2/15/24</a:t>
             </a:fld>
             <a:endParaRPr lang="en-US"/>
           </a:p>
@@ -858,7 +864,7 @@
           <a:p>
             <a:fld id="{4E8FC487-CEE2-CA44-A5A6-98354CD61BBA}" type="datetimeFigureOut">
               <a:rPr lang="en-US" smtClean="0"/>
-              <a:t>1/16/24</a:t>
+              <a:t>2/15/24</a:t>
             </a:fld>
             <a:endParaRPr lang="en-US"/>
           </a:p>
@@ -1133,7 +1139,7 @@
           <a:p>
             <a:fld id="{4E8FC487-CEE2-CA44-A5A6-98354CD61BBA}" type="datetimeFigureOut">
               <a:rPr lang="en-US" smtClean="0"/>
-              <a:t>1/16/24</a:t>
+              <a:t>2/15/24</a:t>
             </a:fld>
             <a:endParaRPr lang="en-US"/>
           </a:p>
@@ -1398,7 +1404,7 @@
           <a:p>
             <a:fld id="{4E8FC487-CEE2-CA44-A5A6-98354CD61BBA}" type="datetimeFigureOut">
               <a:rPr lang="en-US" smtClean="0"/>
-              <a:t>1/16/24</a:t>
+              <a:t>2/15/24</a:t>
             </a:fld>
             <a:endParaRPr lang="en-US"/>
           </a:p>
@@ -1810,7 +1816,7 @@
           <a:p>
             <a:fld id="{4E8FC487-CEE2-CA44-A5A6-98354CD61BBA}" type="datetimeFigureOut">
               <a:rPr lang="en-US" smtClean="0"/>
-              <a:t>1/16/24</a:t>
+              <a:t>2/15/24</a:t>
             </a:fld>
             <a:endParaRPr lang="en-US"/>
           </a:p>
@@ -1951,7 +1957,7 @@
           <a:p>
             <a:fld id="{4E8FC487-CEE2-CA44-A5A6-98354CD61BBA}" type="datetimeFigureOut">
               <a:rPr lang="en-US" smtClean="0"/>
-              <a:t>1/16/24</a:t>
+              <a:t>2/15/24</a:t>
             </a:fld>
             <a:endParaRPr lang="en-US"/>
           </a:p>
@@ -2064,7 +2070,7 @@
           <a:p>
             <a:fld id="{4E8FC487-CEE2-CA44-A5A6-98354CD61BBA}" type="datetimeFigureOut">
               <a:rPr lang="en-US" smtClean="0"/>
-              <a:t>1/16/24</a:t>
+              <a:t>2/15/24</a:t>
             </a:fld>
             <a:endParaRPr lang="en-US"/>
           </a:p>
@@ -2375,7 +2381,7 @@
           <a:p>
             <a:fld id="{4E8FC487-CEE2-CA44-A5A6-98354CD61BBA}" type="datetimeFigureOut">
               <a:rPr lang="en-US" smtClean="0"/>
-              <a:t>1/16/24</a:t>
+              <a:t>2/15/24</a:t>
             </a:fld>
             <a:endParaRPr lang="en-US"/>
           </a:p>
@@ -2663,7 +2669,7 @@
           <a:p>
             <a:fld id="{4E8FC487-CEE2-CA44-A5A6-98354CD61BBA}" type="datetimeFigureOut">
               <a:rPr lang="en-US" smtClean="0"/>
-              <a:t>1/16/24</a:t>
+              <a:t>2/15/24</a:t>
             </a:fld>
             <a:endParaRPr lang="en-US"/>
           </a:p>
@@ -2904,7 +2910,7 @@
           <a:p>
             <a:fld id="{4E8FC487-CEE2-CA44-A5A6-98354CD61BBA}" type="datetimeFigureOut">
               <a:rPr lang="en-US" smtClean="0"/>
-              <a:t>1/16/24</a:t>
+              <a:t>2/15/24</a:t>
             </a:fld>
             <a:endParaRPr lang="en-US"/>
           </a:p>
@@ -3963,6 +3969,651 @@
 </p:sld>
 </file>
 
+<file path=ppt/slides/slide2.xml><?xml version="1.0" encoding="utf-8"?>
+<p:sld xmlns:a="http://schemas.openxmlformats.org/drawingml/2006/main" xmlns:r="http://schemas.openxmlformats.org/officeDocument/2006/relationships" xmlns:p="http://schemas.openxmlformats.org/presentationml/2006/main">
+  <p:cSld>
+    <p:spTree>
+      <p:nvGrpSpPr>
+        <p:cNvPr id="1" name=""/>
+        <p:cNvGrpSpPr/>
+        <p:nvPr/>
+      </p:nvGrpSpPr>
+      <p:grpSpPr>
+        <a:xfrm>
+          <a:off x="0" y="0"/>
+          <a:ext cx="0" cy="0"/>
+          <a:chOff x="0" y="0"/>
+          <a:chExt cx="0" cy="0"/>
+        </a:xfrm>
+      </p:grpSpPr>
+      <p:grpSp>
+        <p:nvGrpSpPr>
+          <p:cNvPr id="4" name="Group 3">
+            <a:extLst>
+              <a:ext uri="{FF2B5EF4-FFF2-40B4-BE49-F238E27FC236}">
+                <a16:creationId xmlns:a16="http://schemas.microsoft.com/office/drawing/2014/main" id="{884140BD-C304-FFD6-9815-640A080CA5ED}"/>
+              </a:ext>
+            </a:extLst>
+          </p:cNvPr>
+          <p:cNvGrpSpPr/>
+          <p:nvPr/>
+        </p:nvGrpSpPr>
+        <p:grpSpPr>
+          <a:xfrm>
+            <a:off x="3375279" y="2585323"/>
+            <a:ext cx="2921877" cy="2501171"/>
+            <a:chOff x="3100550" y="1261241"/>
+            <a:chExt cx="2132297" cy="2501171"/>
+          </a:xfrm>
+        </p:grpSpPr>
+        <p:sp>
+          <p:nvSpPr>
+            <p:cNvPr id="5" name="TextBox 4">
+              <a:extLst>
+                <a:ext uri="{FF2B5EF4-FFF2-40B4-BE49-F238E27FC236}">
+                  <a16:creationId xmlns:a16="http://schemas.microsoft.com/office/drawing/2014/main" id="{BA8C7B2E-9635-B4CA-9175-CC781ECE5D63}"/>
+                </a:ext>
+              </a:extLst>
+            </p:cNvPr>
+            <p:cNvSpPr txBox="1"/>
+            <p:nvPr/>
+          </p:nvSpPr>
+          <p:spPr>
+            <a:xfrm>
+              <a:off x="3100550" y="1261241"/>
+              <a:ext cx="2132295" cy="369332"/>
+            </a:xfrm>
+            <a:prstGeom prst="rect">
+              <a:avLst/>
+            </a:prstGeom>
+            <a:noFill/>
+            <a:ln w="19050">
+              <a:solidFill>
+                <a:schemeClr val="tx1"/>
+              </a:solidFill>
+            </a:ln>
+          </p:spPr>
+          <p:txBody>
+            <a:bodyPr wrap="square" rtlCol="0">
+              <a:spAutoFit/>
+            </a:bodyPr>
+            <a:lstStyle/>
+            <a:p>
+              <a:pPr algn="ctr"/>
+              <a:r>
+                <a:rPr lang="en-US" dirty="0"/>
+                <a:t>Circle Class Definition</a:t>
+              </a:r>
+            </a:p>
+          </p:txBody>
+        </p:sp>
+        <p:sp>
+          <p:nvSpPr>
+            <p:cNvPr id="6" name="TextBox 5">
+              <a:extLst>
+                <a:ext uri="{FF2B5EF4-FFF2-40B4-BE49-F238E27FC236}">
+                  <a16:creationId xmlns:a16="http://schemas.microsoft.com/office/drawing/2014/main" id="{59A0378D-180A-83D0-839E-A19CE6F0CF52}"/>
+                </a:ext>
+              </a:extLst>
+            </p:cNvPr>
+            <p:cNvSpPr txBox="1"/>
+            <p:nvPr/>
+          </p:nvSpPr>
+          <p:spPr>
+            <a:xfrm>
+              <a:off x="3100551" y="1630573"/>
+              <a:ext cx="2132295" cy="923330"/>
+            </a:xfrm>
+            <a:prstGeom prst="rect">
+              <a:avLst/>
+            </a:prstGeom>
+            <a:noFill/>
+            <a:ln w="19050">
+              <a:solidFill>
+                <a:schemeClr val="tx1"/>
+              </a:solidFill>
+            </a:ln>
+          </p:spPr>
+          <p:txBody>
+            <a:bodyPr wrap="square" rtlCol="0">
+              <a:spAutoFit/>
+            </a:bodyPr>
+            <a:lstStyle/>
+            <a:p>
+              <a:r>
+                <a:rPr lang="en-US" dirty="0"/>
+                <a:t>Member Variables</a:t>
+              </a:r>
+            </a:p>
+            <a:p>
+              <a:r>
+                <a:rPr lang="en-US" dirty="0"/>
+                <a:t>   radius</a:t>
+              </a:r>
+            </a:p>
+            <a:p>
+              <a:r>
+                <a:rPr lang="en-US" dirty="0"/>
+                <a:t>   pi</a:t>
+              </a:r>
+            </a:p>
+          </p:txBody>
+        </p:sp>
+        <p:sp>
+          <p:nvSpPr>
+            <p:cNvPr id="7" name="TextBox 6">
+              <a:extLst>
+                <a:ext uri="{FF2B5EF4-FFF2-40B4-BE49-F238E27FC236}">
+                  <a16:creationId xmlns:a16="http://schemas.microsoft.com/office/drawing/2014/main" id="{04FD5513-0641-BD72-946B-22DBA9764F30}"/>
+                </a:ext>
+              </a:extLst>
+            </p:cNvPr>
+            <p:cNvSpPr txBox="1"/>
+            <p:nvPr/>
+          </p:nvSpPr>
+          <p:spPr>
+            <a:xfrm>
+              <a:off x="3100552" y="2562083"/>
+              <a:ext cx="2132295" cy="1200329"/>
+            </a:xfrm>
+            <a:prstGeom prst="rect">
+              <a:avLst/>
+            </a:prstGeom>
+            <a:noFill/>
+            <a:ln w="19050">
+              <a:solidFill>
+                <a:schemeClr val="tx1"/>
+              </a:solidFill>
+            </a:ln>
+          </p:spPr>
+          <p:txBody>
+            <a:bodyPr wrap="square" rtlCol="0">
+              <a:spAutoFit/>
+            </a:bodyPr>
+            <a:lstStyle/>
+            <a:p>
+              <a:r>
+                <a:rPr lang="en-US" dirty="0"/>
+                <a:t>Member Functions</a:t>
+              </a:r>
+            </a:p>
+            <a:p>
+              <a:r>
+                <a:rPr lang="en-US" dirty="0"/>
+                <a:t>    __</a:t>
+              </a:r>
+              <a:r>
+                <a:rPr lang="en-US" dirty="0" err="1"/>
+                <a:t>init</a:t>
+              </a:r>
+              <a:r>
+                <a:rPr lang="en-US" dirty="0"/>
+                <a:t>__()</a:t>
+              </a:r>
+            </a:p>
+            <a:p>
+              <a:r>
+                <a:rPr lang="en-US" dirty="0"/>
+                <a:t>   area() </a:t>
+              </a:r>
+            </a:p>
+            <a:p>
+              <a:r>
+                <a:rPr lang="en-US" dirty="0"/>
+                <a:t>   circumference()</a:t>
+              </a:r>
+            </a:p>
+          </p:txBody>
+        </p:sp>
+      </p:grpSp>
+      <p:sp>
+        <p:nvSpPr>
+          <p:cNvPr id="8" name="TextBox 7">
+            <a:extLst>
+              <a:ext uri="{FF2B5EF4-FFF2-40B4-BE49-F238E27FC236}">
+                <a16:creationId xmlns:a16="http://schemas.microsoft.com/office/drawing/2014/main" id="{1718A4F0-D42E-45F9-F96E-51A5CE5E4079}"/>
+              </a:ext>
+            </a:extLst>
+          </p:cNvPr>
+          <p:cNvSpPr txBox="1"/>
+          <p:nvPr/>
+        </p:nvSpPr>
+        <p:spPr>
+          <a:xfrm>
+            <a:off x="6750564" y="0"/>
+            <a:ext cx="5412822" cy="5786199"/>
+          </a:xfrm>
+          <a:prstGeom prst="rect">
+            <a:avLst/>
+          </a:prstGeom>
+          <a:noFill/>
+        </p:spPr>
+        <p:txBody>
+          <a:bodyPr wrap="square" rtlCol="0">
+            <a:spAutoFit/>
+          </a:bodyPr>
+          <a:lstStyle/>
+          <a:p>
+            <a:r>
+              <a:rPr lang="en-US" sz="1000" i="1" dirty="0"/>
+              <a:t>Defining a class lets you create your own variables </a:t>
+            </a:r>
+          </a:p>
+          <a:p>
+            <a:endParaRPr lang="en-US" sz="1000" i="1" dirty="0"/>
+          </a:p>
+          <a:p>
+            <a:r>
+              <a:rPr lang="en-US" sz="1000" i="1" dirty="0"/>
+              <a:t>You've seen </a:t>
+            </a:r>
+          </a:p>
+          <a:p>
+            <a:r>
+              <a:rPr lang="en-US" sz="1000" i="1" dirty="0"/>
+              <a:t>- variables that are numbers</a:t>
+            </a:r>
+          </a:p>
+          <a:p>
+            <a:r>
+              <a:rPr lang="en-US" sz="1000" i="1" dirty="0"/>
+              <a:t>- variables that are strings</a:t>
+            </a:r>
+          </a:p>
+          <a:p>
+            <a:r>
+              <a:rPr lang="en-US" sz="1000" i="1" dirty="0"/>
+              <a:t>- variables that are lists</a:t>
+            </a:r>
+          </a:p>
+          <a:p>
+            <a:endParaRPr lang="en-US" sz="1000" i="1" dirty="0"/>
+          </a:p>
+          <a:p>
+            <a:r>
+              <a:rPr lang="en-US" sz="1000" i="1" dirty="0"/>
+              <a:t>You've seen the turtle variable, which is a custom variable type written for this class</a:t>
+            </a:r>
+          </a:p>
+          <a:p>
+            <a:endParaRPr lang="en-US" sz="1000" i="1" dirty="0"/>
+          </a:p>
+          <a:p>
+            <a:r>
+              <a:rPr lang="en-US" sz="1000" i="1" dirty="0"/>
+              <a:t>Here, we show you how to define your own new custom variable type, which we call an object</a:t>
+            </a:r>
+          </a:p>
+          <a:p>
+            <a:endParaRPr lang="en-US" sz="1000" i="1" dirty="0"/>
+          </a:p>
+          <a:p>
+            <a:r>
+              <a:rPr lang="en-US" sz="1000" i="1" dirty="0"/>
+              <a:t>We define a circle object</a:t>
+            </a:r>
+          </a:p>
+          <a:p>
+            <a:r>
+              <a:rPr lang="en-US" sz="1000" i="1" dirty="0"/>
+              <a:t>   - The circle has one attributes (radius)</a:t>
+            </a:r>
+          </a:p>
+          <a:p>
+            <a:r>
+              <a:rPr lang="en-US" sz="1000" i="1" dirty="0"/>
+              <a:t>   - Three functions (__</a:t>
+            </a:r>
+            <a:r>
+              <a:rPr lang="en-US" sz="1000" i="1" dirty="0" err="1"/>
+              <a:t>init</a:t>
+            </a:r>
+            <a:r>
+              <a:rPr lang="en-US" sz="1000" i="1" dirty="0"/>
+              <a:t>__(), area(), and circumference())</a:t>
+            </a:r>
+          </a:p>
+          <a:p>
+            <a:r>
+              <a:rPr lang="en-US" sz="1000" i="1" dirty="0"/>
+              <a:t>   - __</a:t>
+            </a:r>
+            <a:r>
+              <a:rPr lang="en-US" sz="1000" i="1" dirty="0" err="1"/>
+              <a:t>init</a:t>
+            </a:r>
+            <a:r>
+              <a:rPr lang="en-US" sz="1000" i="1" dirty="0"/>
+              <a:t>__()  is a special function used to create new objects</a:t>
+            </a:r>
+          </a:p>
+          <a:p>
+            <a:r>
+              <a:rPr lang="en-US" sz="1000" i="1" dirty="0"/>
+              <a:t>   - area() and circumference() let you define the behavior </a:t>
+            </a:r>
+            <a:br>
+              <a:rPr lang="en-US" sz="1000" i="1" dirty="0"/>
+            </a:br>
+            <a:r>
+              <a:rPr lang="en-US" sz="1000" i="1" dirty="0"/>
+              <a:t>     of your new variable, that is, you can automatically</a:t>
+            </a:r>
+          </a:p>
+          <a:p>
+            <a:r>
+              <a:rPr lang="en-US" sz="1000" i="1" dirty="0"/>
+              <a:t>     compute the area and circumference</a:t>
+            </a:r>
+          </a:p>
+          <a:p>
+            <a:endParaRPr lang="en-US" sz="1000" i="1" dirty="0"/>
+          </a:p>
+          <a:p>
+            <a:r>
+              <a:rPr lang="en-US" sz="1000" i="1" dirty="0"/>
+              <a:t>Defining an object is similar to defining a function.  </a:t>
+            </a:r>
+          </a:p>
+          <a:p>
+            <a:pPr marL="342900" indent="-342900">
+              <a:buAutoNum type="arabicParenR"/>
+            </a:pPr>
+            <a:r>
+              <a:rPr lang="en-US" sz="1000" i="1" dirty="0"/>
+              <a:t>First you have to run a cell that describes your object's structure.  </a:t>
+            </a:r>
+            <a:br>
+              <a:rPr lang="en-US" sz="1000" i="1" dirty="0"/>
+            </a:br>
+            <a:r>
+              <a:rPr lang="en-US" sz="1000" i="1" dirty="0"/>
+              <a:t>Let's say that object is called circle and contains</a:t>
+            </a:r>
+          </a:p>
+          <a:p>
+            <a:pPr marL="342900" indent="-342900">
+              <a:buAutoNum type="arabicParenR"/>
+            </a:pPr>
+            <a:endParaRPr lang="en-US" sz="1000" i="1" dirty="0"/>
+          </a:p>
+          <a:p>
+            <a:pPr marL="342900" indent="-342900">
+              <a:buAutoNum type="arabicParenR"/>
+            </a:pPr>
+            <a:endParaRPr lang="en-US" sz="1000" i="1" dirty="0"/>
+          </a:p>
+          <a:p>
+            <a:pPr marL="342900" indent="-342900">
+              <a:buAutoNum type="arabicParenR"/>
+            </a:pPr>
+            <a:endParaRPr lang="en-US" sz="1000" i="1" dirty="0"/>
+          </a:p>
+          <a:p>
+            <a:pPr marL="342900" indent="-342900">
+              <a:buAutoNum type="arabicParenR"/>
+            </a:pPr>
+            <a:endParaRPr lang="en-US" sz="1000" i="1" dirty="0"/>
+          </a:p>
+          <a:p>
+            <a:pPr marL="342900" indent="-342900">
+              <a:buAutoNum type="arabicParenR"/>
+            </a:pPr>
+            <a:r>
+              <a:rPr lang="en-US" sz="1000" i="1" dirty="0"/>
+              <a:t>You create your objects (as may as you want) like you create your turtle</a:t>
+            </a:r>
+            <a:br>
+              <a:rPr lang="en-US" sz="1000" i="1" dirty="0"/>
+            </a:br>
+            <a:r>
+              <a:rPr lang="en-US" sz="1000" i="1" dirty="0"/>
+              <a:t>circle1 = circle()</a:t>
+            </a:r>
+            <a:br>
+              <a:rPr lang="en-US" sz="1000" i="1" dirty="0"/>
+            </a:br>
+            <a:r>
+              <a:rPr lang="en-US" sz="1000" i="1" dirty="0"/>
+              <a:t>circle1.radius = 4</a:t>
+            </a:r>
+            <a:br>
+              <a:rPr lang="en-US" sz="1000" i="1" dirty="0"/>
+            </a:br>
+            <a:r>
+              <a:rPr lang="en-US" sz="1000" i="1" dirty="0"/>
+              <a:t>circle1.pi = 3.14159</a:t>
+            </a:r>
+            <a:br>
+              <a:rPr lang="en-US" sz="1000" i="1" dirty="0"/>
+            </a:br>
+            <a:r>
+              <a:rPr lang="en-US" sz="1000" i="1" dirty="0"/>
+              <a:t>print(circle1.area(), "area of circle 1")</a:t>
+            </a:r>
+            <a:br>
+              <a:rPr lang="en-US" sz="1000" i="1" dirty="0"/>
+            </a:br>
+            <a:r>
+              <a:rPr lang="en-US" sz="1000" i="1" dirty="0"/>
+              <a:t>circle2 = circle()</a:t>
+            </a:r>
+            <a:br>
+              <a:rPr lang="en-US" sz="1000" i="1" dirty="0"/>
+            </a:br>
+            <a:r>
+              <a:rPr lang="en-US" sz="1000" i="1" dirty="0"/>
+              <a:t>circle2.radius = 2</a:t>
+            </a:r>
+            <a:br>
+              <a:rPr lang="en-US" sz="1000" i="1" dirty="0"/>
+            </a:br>
+            <a:r>
+              <a:rPr lang="en-US" sz="1000" i="1" dirty="0"/>
+              <a:t>circle2.pi = 3.14159</a:t>
+            </a:r>
+            <a:br>
+              <a:rPr lang="en-US" sz="1000" i="1" dirty="0"/>
+            </a:br>
+            <a:r>
+              <a:rPr lang="en-US" sz="1000" i="1" dirty="0"/>
+              <a:t>print(circle2.area(), "area of circle 2")</a:t>
+            </a:r>
+          </a:p>
+          <a:p>
+            <a:endParaRPr lang="en-US" sz="1000" i="1" dirty="0"/>
+          </a:p>
+          <a:p>
+            <a:r>
+              <a:rPr lang="en-US" sz="1000" i="1" dirty="0"/>
+              <a:t>Now, create a new circle3, and give it a new radius.  Print the area and circumference to the screen.</a:t>
+            </a:r>
+          </a:p>
+        </p:txBody>
+      </p:sp>
+      <p:sp>
+        <p:nvSpPr>
+          <p:cNvPr id="9" name="TextBox 8">
+            <a:extLst>
+              <a:ext uri="{FF2B5EF4-FFF2-40B4-BE49-F238E27FC236}">
+                <a16:creationId xmlns:a16="http://schemas.microsoft.com/office/drawing/2014/main" id="{50399B33-7CDC-7EB8-D42D-8B8CF1071571}"/>
+              </a:ext>
+            </a:extLst>
+          </p:cNvPr>
+          <p:cNvSpPr txBox="1"/>
+          <p:nvPr/>
+        </p:nvSpPr>
+        <p:spPr>
+          <a:xfrm>
+            <a:off x="632178" y="356648"/>
+            <a:ext cx="4118435" cy="1754326"/>
+          </a:xfrm>
+          <a:prstGeom prst="rect">
+            <a:avLst/>
+          </a:prstGeom>
+          <a:noFill/>
+        </p:spPr>
+        <p:txBody>
+          <a:bodyPr wrap="none" rtlCol="0">
+            <a:spAutoFit/>
+          </a:bodyPr>
+          <a:lstStyle/>
+          <a:p>
+            <a:r>
+              <a:rPr lang="en-US" dirty="0"/>
+              <a:t>Slim down material for Monday,</a:t>
+            </a:r>
+          </a:p>
+          <a:p>
+            <a:r>
+              <a:rPr lang="en-US" dirty="0"/>
+              <a:t>use class chart without member functions</a:t>
+            </a:r>
+          </a:p>
+          <a:p>
+            <a:endParaRPr lang="en-US" dirty="0"/>
+          </a:p>
+          <a:p>
+            <a:r>
+              <a:rPr lang="en-US" dirty="0"/>
+              <a:t>Wed and Friday both show class chart</a:t>
+            </a:r>
+          </a:p>
+          <a:p>
+            <a:endParaRPr lang="en-US" dirty="0"/>
+          </a:p>
+          <a:p>
+            <a:endParaRPr lang="en-US" dirty="0"/>
+          </a:p>
+        </p:txBody>
+      </p:sp>
+      <p:grpSp>
+        <p:nvGrpSpPr>
+          <p:cNvPr id="10" name="Group 9">
+            <a:extLst>
+              <a:ext uri="{FF2B5EF4-FFF2-40B4-BE49-F238E27FC236}">
+                <a16:creationId xmlns:a16="http://schemas.microsoft.com/office/drawing/2014/main" id="{93A80FAD-A277-A96A-B59E-33BF0A9C197C}"/>
+              </a:ext>
+            </a:extLst>
+          </p:cNvPr>
+          <p:cNvGrpSpPr/>
+          <p:nvPr/>
+        </p:nvGrpSpPr>
+        <p:grpSpPr>
+          <a:xfrm>
+            <a:off x="146757" y="2585323"/>
+            <a:ext cx="2921876" cy="1292662"/>
+            <a:chOff x="3100550" y="1261241"/>
+            <a:chExt cx="2132296" cy="1292662"/>
+          </a:xfrm>
+        </p:grpSpPr>
+        <p:sp>
+          <p:nvSpPr>
+            <p:cNvPr id="11" name="TextBox 10">
+              <a:extLst>
+                <a:ext uri="{FF2B5EF4-FFF2-40B4-BE49-F238E27FC236}">
+                  <a16:creationId xmlns:a16="http://schemas.microsoft.com/office/drawing/2014/main" id="{AC755864-A815-21A9-8B81-CA2DAEDE3593}"/>
+                </a:ext>
+              </a:extLst>
+            </p:cNvPr>
+            <p:cNvSpPr txBox="1"/>
+            <p:nvPr/>
+          </p:nvSpPr>
+          <p:spPr>
+            <a:xfrm>
+              <a:off x="3100550" y="1261241"/>
+              <a:ext cx="2132295" cy="369332"/>
+            </a:xfrm>
+            <a:prstGeom prst="rect">
+              <a:avLst/>
+            </a:prstGeom>
+            <a:noFill/>
+            <a:ln w="19050">
+              <a:solidFill>
+                <a:schemeClr val="tx1"/>
+              </a:solidFill>
+            </a:ln>
+          </p:spPr>
+          <p:txBody>
+            <a:bodyPr wrap="square" rtlCol="0">
+              <a:spAutoFit/>
+            </a:bodyPr>
+            <a:lstStyle/>
+            <a:p>
+              <a:pPr algn="ctr"/>
+              <a:r>
+                <a:rPr lang="en-US" dirty="0"/>
+                <a:t>Circle Class Definition</a:t>
+              </a:r>
+            </a:p>
+          </p:txBody>
+        </p:sp>
+        <p:sp>
+          <p:nvSpPr>
+            <p:cNvPr id="12" name="TextBox 11">
+              <a:extLst>
+                <a:ext uri="{FF2B5EF4-FFF2-40B4-BE49-F238E27FC236}">
+                  <a16:creationId xmlns:a16="http://schemas.microsoft.com/office/drawing/2014/main" id="{34745FFF-D0BA-3C9A-9547-A80B59B7195A}"/>
+                </a:ext>
+              </a:extLst>
+            </p:cNvPr>
+            <p:cNvSpPr txBox="1"/>
+            <p:nvPr/>
+          </p:nvSpPr>
+          <p:spPr>
+            <a:xfrm>
+              <a:off x="3100551" y="1630573"/>
+              <a:ext cx="2132295" cy="923330"/>
+            </a:xfrm>
+            <a:prstGeom prst="rect">
+              <a:avLst/>
+            </a:prstGeom>
+            <a:noFill/>
+            <a:ln w="19050">
+              <a:solidFill>
+                <a:schemeClr val="tx1"/>
+              </a:solidFill>
+            </a:ln>
+          </p:spPr>
+          <p:txBody>
+            <a:bodyPr wrap="square" rtlCol="0">
+              <a:spAutoFit/>
+            </a:bodyPr>
+            <a:lstStyle/>
+            <a:p>
+              <a:r>
+                <a:rPr lang="en-US" dirty="0"/>
+                <a:t>Member Variables</a:t>
+              </a:r>
+            </a:p>
+            <a:p>
+              <a:r>
+                <a:rPr lang="en-US" dirty="0"/>
+                <a:t>   radius</a:t>
+              </a:r>
+            </a:p>
+            <a:p>
+              <a:r>
+                <a:rPr lang="en-US" dirty="0"/>
+                <a:t>   pi</a:t>
+              </a:r>
+            </a:p>
+          </p:txBody>
+        </p:sp>
+      </p:grpSp>
+    </p:spTree>
+    <p:extLst>
+      <p:ext uri="{BB962C8B-B14F-4D97-AF65-F5344CB8AC3E}">
+        <p14:creationId xmlns:p14="http://schemas.microsoft.com/office/powerpoint/2010/main" val="1712293671"/>
+      </p:ext>
+    </p:extLst>
+  </p:cSld>
+  <p:clrMapOvr>
+    <a:masterClrMapping/>
+  </p:clrMapOvr>
+</p:sld>
+</file>
+
 <file path=ppt/theme/theme1.xml><?xml version="1.0" encoding="utf-8"?>
 <a:theme xmlns:a="http://schemas.openxmlformats.org/drawingml/2006/main" name="Office Theme">
   <a:themeElements>

</xml_diff>